<commit_message>
use case diagramm and some chapter edition
</commit_message>
<xml_diff>
--- a/docs/notenapp.pptx
+++ b/docs/notenapp.pptx
@@ -292,7 +292,7 @@
             <a:fld id="{F0B96F50-2E74-4531-A9D7-82F060543DE4}" type="datetimeFigureOut">
               <a:rPr lang="de-DE" smtClean="0"/>
               <a:pPr/>
-              <a:t>12.01.2013</a:t>
+              <a:t>13.01.2013</a:t>
             </a:fld>
             <a:endParaRPr lang="de-DE"/>
           </a:p>
@@ -459,7 +459,7 @@
             <a:fld id="{F0B96F50-2E74-4531-A9D7-82F060543DE4}" type="datetimeFigureOut">
               <a:rPr lang="de-DE" smtClean="0"/>
               <a:pPr/>
-              <a:t>12.01.2013</a:t>
+              <a:t>13.01.2013</a:t>
             </a:fld>
             <a:endParaRPr lang="de-DE"/>
           </a:p>
@@ -636,7 +636,7 @@
             <a:fld id="{F0B96F50-2E74-4531-A9D7-82F060543DE4}" type="datetimeFigureOut">
               <a:rPr lang="de-DE" smtClean="0"/>
               <a:pPr/>
-              <a:t>12.01.2013</a:t>
+              <a:t>13.01.2013</a:t>
             </a:fld>
             <a:endParaRPr lang="de-DE"/>
           </a:p>
@@ -803,7 +803,7 @@
             <a:fld id="{F0B96F50-2E74-4531-A9D7-82F060543DE4}" type="datetimeFigureOut">
               <a:rPr lang="de-DE" smtClean="0"/>
               <a:pPr/>
-              <a:t>12.01.2013</a:t>
+              <a:t>13.01.2013</a:t>
             </a:fld>
             <a:endParaRPr lang="de-DE"/>
           </a:p>
@@ -1046,7 +1046,7 @@
             <a:fld id="{F0B96F50-2E74-4531-A9D7-82F060543DE4}" type="datetimeFigureOut">
               <a:rPr lang="de-DE" smtClean="0"/>
               <a:pPr/>
-              <a:t>12.01.2013</a:t>
+              <a:t>13.01.2013</a:t>
             </a:fld>
             <a:endParaRPr lang="de-DE"/>
           </a:p>
@@ -1331,7 +1331,7 @@
             <a:fld id="{F0B96F50-2E74-4531-A9D7-82F060543DE4}" type="datetimeFigureOut">
               <a:rPr lang="de-DE" smtClean="0"/>
               <a:pPr/>
-              <a:t>12.01.2013</a:t>
+              <a:t>13.01.2013</a:t>
             </a:fld>
             <a:endParaRPr lang="de-DE"/>
           </a:p>
@@ -1750,7 +1750,7 @@
             <a:fld id="{F0B96F50-2E74-4531-A9D7-82F060543DE4}" type="datetimeFigureOut">
               <a:rPr lang="de-DE" smtClean="0"/>
               <a:pPr/>
-              <a:t>12.01.2013</a:t>
+              <a:t>13.01.2013</a:t>
             </a:fld>
             <a:endParaRPr lang="de-DE"/>
           </a:p>
@@ -1865,7 +1865,7 @@
             <a:fld id="{F0B96F50-2E74-4531-A9D7-82F060543DE4}" type="datetimeFigureOut">
               <a:rPr lang="de-DE" smtClean="0"/>
               <a:pPr/>
-              <a:t>12.01.2013</a:t>
+              <a:t>13.01.2013</a:t>
             </a:fld>
             <a:endParaRPr lang="de-DE"/>
           </a:p>
@@ -1957,7 +1957,7 @@
             <a:fld id="{F0B96F50-2E74-4531-A9D7-82F060543DE4}" type="datetimeFigureOut">
               <a:rPr lang="de-DE" smtClean="0"/>
               <a:pPr/>
-              <a:t>12.01.2013</a:t>
+              <a:t>13.01.2013</a:t>
             </a:fld>
             <a:endParaRPr lang="de-DE"/>
           </a:p>
@@ -2231,7 +2231,7 @@
             <a:fld id="{F0B96F50-2E74-4531-A9D7-82F060543DE4}" type="datetimeFigureOut">
               <a:rPr lang="de-DE" smtClean="0"/>
               <a:pPr/>
-              <a:t>12.01.2013</a:t>
+              <a:t>13.01.2013</a:t>
             </a:fld>
             <a:endParaRPr lang="de-DE"/>
           </a:p>
@@ -2481,7 +2481,7 @@
             <a:fld id="{F0B96F50-2E74-4531-A9D7-82F060543DE4}" type="datetimeFigureOut">
               <a:rPr lang="de-DE" smtClean="0"/>
               <a:pPr/>
-              <a:t>12.01.2013</a:t>
+              <a:t>13.01.2013</a:t>
             </a:fld>
             <a:endParaRPr lang="de-DE"/>
           </a:p>
@@ -2691,7 +2691,7 @@
             <a:fld id="{F0B96F50-2E74-4531-A9D7-82F060543DE4}" type="datetimeFigureOut">
               <a:rPr lang="de-DE" smtClean="0"/>
               <a:pPr/>
-              <a:t>12.01.2013</a:t>
+              <a:t>13.01.2013</a:t>
             </a:fld>
             <a:endParaRPr lang="de-DE"/>
           </a:p>
@@ -9799,20 +9799,20 @@
       </p:grpSpPr>
       <p:sp>
         <p:nvSpPr>
-          <p:cNvPr id="2" name="Ellipse 1"/>
+          <p:cNvPr id="4" name="Rechteck 3"/>
           <p:cNvSpPr/>
           <p:nvPr/>
         </p:nvSpPr>
         <p:spPr>
           <a:xfrm>
-            <a:off x="1331640" y="1484784"/>
-            <a:ext cx="1061171" cy="564228"/>
-          </a:xfrm>
-          <a:prstGeom prst="ellipse">
+            <a:off x="3059832" y="260648"/>
+            <a:ext cx="1872208" cy="2664296"/>
+          </a:xfrm>
+          <a:prstGeom prst="rect">
             <a:avLst/>
           </a:prstGeom>
           <a:noFill/>
-          <a:ln>
+          <a:ln w="6350">
             <a:solidFill>
               <a:schemeClr val="tx1"/>
             </a:solidFill>
@@ -9839,14 +9839,532 @@
           <a:lstStyle/>
           <a:p>
             <a:pPr algn="ctr"/>
-            <a:r>
-              <a:rPr lang="de-DE" sz="1200" dirty="0" smtClean="0">
+            <a:endParaRPr lang="de-DE" sz="1200" dirty="0"/>
+          </a:p>
+        </p:txBody>
+      </p:sp>
+      <p:sp>
+        <p:nvSpPr>
+          <p:cNvPr id="5" name="Ellipse 4"/>
+          <p:cNvSpPr/>
+          <p:nvPr/>
+        </p:nvSpPr>
+        <p:spPr>
+          <a:xfrm>
+            <a:off x="3347864" y="332656"/>
+            <a:ext cx="1440160" cy="360040"/>
+          </a:xfrm>
+          <a:prstGeom prst="ellipse">
+            <a:avLst/>
+          </a:prstGeom>
+          <a:noFill/>
+          <a:ln w="6350">
+            <a:solidFill>
+              <a:schemeClr val="tx1"/>
+            </a:solidFill>
+          </a:ln>
+        </p:spPr>
+        <p:style>
+          <a:lnRef idx="2">
+            <a:schemeClr val="accent1">
+              <a:shade val="50000"/>
+            </a:schemeClr>
+          </a:lnRef>
+          <a:fillRef idx="1">
+            <a:schemeClr val="accent1"/>
+          </a:fillRef>
+          <a:effectRef idx="0">
+            <a:schemeClr val="accent1"/>
+          </a:effectRef>
+          <a:fontRef idx="minor">
+            <a:schemeClr val="lt1"/>
+          </a:fontRef>
+        </p:style>
+        <p:txBody>
+          <a:bodyPr rtlCol="0" anchor="ctr"/>
+          <a:lstStyle/>
+          <a:p>
+            <a:pPr algn="ctr"/>
+            <a:r>
+              <a:rPr lang="de-DE" sz="1100" dirty="0" smtClean="0">
                 <a:solidFill>
                   <a:schemeClr val="tx1"/>
                 </a:solidFill>
               </a:rPr>
-              <a:t>Benutzer</a:t>
-            </a:r>
+              <a:t>Abschlüsse anzeigen</a:t>
+            </a:r>
+            <a:endParaRPr lang="de-DE" sz="1100" dirty="0">
+              <a:solidFill>
+                <a:schemeClr val="tx1"/>
+              </a:solidFill>
+            </a:endParaRPr>
+          </a:p>
+        </p:txBody>
+      </p:sp>
+      <p:sp>
+        <p:nvSpPr>
+          <p:cNvPr id="6" name="Ellipse 5"/>
+          <p:cNvSpPr/>
+          <p:nvPr/>
+        </p:nvSpPr>
+        <p:spPr>
+          <a:xfrm>
+            <a:off x="3347863" y="836712"/>
+            <a:ext cx="1440161" cy="360040"/>
+          </a:xfrm>
+          <a:prstGeom prst="ellipse">
+            <a:avLst/>
+          </a:prstGeom>
+          <a:noFill/>
+          <a:ln w="6350">
+            <a:solidFill>
+              <a:schemeClr val="tx1"/>
+            </a:solidFill>
+          </a:ln>
+        </p:spPr>
+        <p:style>
+          <a:lnRef idx="2">
+            <a:schemeClr val="accent1">
+              <a:shade val="50000"/>
+            </a:schemeClr>
+          </a:lnRef>
+          <a:fillRef idx="1">
+            <a:schemeClr val="accent1"/>
+          </a:fillRef>
+          <a:effectRef idx="0">
+            <a:schemeClr val="accent1"/>
+          </a:effectRef>
+          <a:fontRef idx="minor">
+            <a:schemeClr val="lt1"/>
+          </a:fontRef>
+        </p:style>
+        <p:txBody>
+          <a:bodyPr rtlCol="0" anchor="ctr"/>
+          <a:lstStyle/>
+          <a:p>
+            <a:pPr algn="ctr"/>
+            <a:r>
+              <a:rPr lang="de-DE" sz="1100" dirty="0" smtClean="0">
+                <a:solidFill>
+                  <a:schemeClr val="tx1"/>
+                </a:solidFill>
+              </a:rPr>
+              <a:t>Kurse/Noten anzeigen</a:t>
+            </a:r>
+            <a:endParaRPr lang="de-DE" sz="1100" dirty="0">
+              <a:solidFill>
+                <a:schemeClr val="tx1"/>
+              </a:solidFill>
+            </a:endParaRPr>
+          </a:p>
+        </p:txBody>
+      </p:sp>
+      <p:sp>
+        <p:nvSpPr>
+          <p:cNvPr id="7" name="Ellipse 6"/>
+          <p:cNvSpPr/>
+          <p:nvPr/>
+        </p:nvSpPr>
+        <p:spPr>
+          <a:xfrm>
+            <a:off x="3347864" y="1340768"/>
+            <a:ext cx="1440160" cy="360040"/>
+          </a:xfrm>
+          <a:prstGeom prst="ellipse">
+            <a:avLst/>
+          </a:prstGeom>
+          <a:noFill/>
+          <a:ln w="6350">
+            <a:solidFill>
+              <a:schemeClr val="tx1"/>
+            </a:solidFill>
+          </a:ln>
+        </p:spPr>
+        <p:style>
+          <a:lnRef idx="2">
+            <a:schemeClr val="accent1">
+              <a:shade val="50000"/>
+            </a:schemeClr>
+          </a:lnRef>
+          <a:fillRef idx="1">
+            <a:schemeClr val="accent1"/>
+          </a:fillRef>
+          <a:effectRef idx="0">
+            <a:schemeClr val="accent1"/>
+          </a:effectRef>
+          <a:fontRef idx="minor">
+            <a:schemeClr val="lt1"/>
+          </a:fontRef>
+        </p:style>
+        <p:txBody>
+          <a:bodyPr rtlCol="0" anchor="ctr"/>
+          <a:lstStyle/>
+          <a:p>
+            <a:pPr algn="ctr"/>
+            <a:r>
+              <a:rPr lang="de-DE" sz="1100" dirty="0" smtClean="0">
+                <a:solidFill>
+                  <a:schemeClr val="tx1"/>
+                </a:solidFill>
+              </a:rPr>
+              <a:t>Kursdetails anzeigen</a:t>
+            </a:r>
+            <a:endParaRPr lang="de-DE" sz="1100" dirty="0">
+              <a:solidFill>
+                <a:schemeClr val="tx1"/>
+              </a:solidFill>
+            </a:endParaRPr>
+          </a:p>
+        </p:txBody>
+      </p:sp>
+      <p:sp>
+        <p:nvSpPr>
+          <p:cNvPr id="8" name="Ellipse 7"/>
+          <p:cNvSpPr/>
+          <p:nvPr/>
+        </p:nvSpPr>
+        <p:spPr>
+          <a:xfrm>
+            <a:off x="3347864" y="1844824"/>
+            <a:ext cx="1440160" cy="470190"/>
+          </a:xfrm>
+          <a:prstGeom prst="ellipse">
+            <a:avLst/>
+          </a:prstGeom>
+          <a:noFill/>
+          <a:ln w="6350">
+            <a:solidFill>
+              <a:schemeClr val="tx1"/>
+            </a:solidFill>
+          </a:ln>
+        </p:spPr>
+        <p:style>
+          <a:lnRef idx="2">
+            <a:schemeClr val="accent1">
+              <a:shade val="50000"/>
+            </a:schemeClr>
+          </a:lnRef>
+          <a:fillRef idx="1">
+            <a:schemeClr val="accent1"/>
+          </a:fillRef>
+          <a:effectRef idx="0">
+            <a:schemeClr val="accent1"/>
+          </a:effectRef>
+          <a:fontRef idx="minor">
+            <a:schemeClr val="lt1"/>
+          </a:fontRef>
+        </p:style>
+        <p:txBody>
+          <a:bodyPr rtlCol="0" anchor="ctr"/>
+          <a:lstStyle/>
+          <a:p>
+            <a:pPr algn="ctr"/>
+            <a:r>
+              <a:rPr lang="de-DE" sz="1100" dirty="0" smtClean="0">
+                <a:solidFill>
+                  <a:schemeClr val="tx1"/>
+                </a:solidFill>
+              </a:rPr>
+              <a:t>Kurse suchen und filtern</a:t>
+            </a:r>
+            <a:endParaRPr lang="de-DE" sz="1100" dirty="0">
+              <a:solidFill>
+                <a:schemeClr val="tx1"/>
+              </a:solidFill>
+            </a:endParaRPr>
+          </a:p>
+        </p:txBody>
+      </p:sp>
+      <p:sp>
+        <p:nvSpPr>
+          <p:cNvPr id="9" name="Ellipse 8"/>
+          <p:cNvSpPr/>
+          <p:nvPr/>
+        </p:nvSpPr>
+        <p:spPr>
+          <a:xfrm>
+            <a:off x="3347864" y="2420888"/>
+            <a:ext cx="1440160" cy="410184"/>
+          </a:xfrm>
+          <a:prstGeom prst="ellipse">
+            <a:avLst/>
+          </a:prstGeom>
+          <a:noFill/>
+          <a:ln w="6350">
+            <a:solidFill>
+              <a:schemeClr val="tx1"/>
+            </a:solidFill>
+          </a:ln>
+        </p:spPr>
+        <p:style>
+          <a:lnRef idx="2">
+            <a:schemeClr val="accent1">
+              <a:shade val="50000"/>
+            </a:schemeClr>
+          </a:lnRef>
+          <a:fillRef idx="1">
+            <a:schemeClr val="accent1"/>
+          </a:fillRef>
+          <a:effectRef idx="0">
+            <a:schemeClr val="accent1"/>
+          </a:effectRef>
+          <a:fontRef idx="minor">
+            <a:schemeClr val="lt1"/>
+          </a:fontRef>
+        </p:style>
+        <p:txBody>
+          <a:bodyPr rtlCol="0" anchor="ctr"/>
+          <a:lstStyle/>
+          <a:p>
+            <a:pPr algn="ctr"/>
+            <a:r>
+              <a:rPr lang="de-DE" sz="1100" dirty="0" smtClean="0">
+                <a:solidFill>
+                  <a:schemeClr val="tx1"/>
+                </a:solidFill>
+              </a:rPr>
+              <a:t>Noten „teilen“</a:t>
+            </a:r>
+            <a:endParaRPr lang="de-DE" sz="1100" dirty="0">
+              <a:solidFill>
+                <a:schemeClr val="tx1"/>
+              </a:solidFill>
+            </a:endParaRPr>
+          </a:p>
+        </p:txBody>
+      </p:sp>
+      <p:cxnSp>
+        <p:nvCxnSpPr>
+          <p:cNvPr id="11" name="Gerade Verbindung mit Pfeil 10"/>
+          <p:cNvCxnSpPr>
+            <a:endCxn id="5" idx="2"/>
+          </p:cNvCxnSpPr>
+          <p:nvPr/>
+        </p:nvCxnSpPr>
+        <p:spPr>
+          <a:xfrm flipV="1">
+            <a:off x="2483768" y="512676"/>
+            <a:ext cx="864096" cy="756084"/>
+          </a:xfrm>
+          <a:prstGeom prst="straightConnector1">
+            <a:avLst/>
+          </a:prstGeom>
+          <a:ln w="6350">
+            <a:solidFill>
+              <a:schemeClr val="tx1"/>
+            </a:solidFill>
+            <a:tailEnd type="none"/>
+          </a:ln>
+        </p:spPr>
+        <p:style>
+          <a:lnRef idx="1">
+            <a:schemeClr val="accent1"/>
+          </a:lnRef>
+          <a:fillRef idx="0">
+            <a:schemeClr val="accent1"/>
+          </a:fillRef>
+          <a:effectRef idx="0">
+            <a:schemeClr val="accent1"/>
+          </a:effectRef>
+          <a:fontRef idx="minor">
+            <a:schemeClr val="tx1"/>
+          </a:fontRef>
+        </p:style>
+      </p:cxnSp>
+      <p:cxnSp>
+        <p:nvCxnSpPr>
+          <p:cNvPr id="12" name="Gerade Verbindung mit Pfeil 11"/>
+          <p:cNvCxnSpPr>
+            <a:endCxn id="6" idx="2"/>
+          </p:cNvCxnSpPr>
+          <p:nvPr/>
+        </p:nvCxnSpPr>
+        <p:spPr>
+          <a:xfrm flipV="1">
+            <a:off x="2555776" y="1016732"/>
+            <a:ext cx="792087" cy="396044"/>
+          </a:xfrm>
+          <a:prstGeom prst="straightConnector1">
+            <a:avLst/>
+          </a:prstGeom>
+          <a:ln w="6350">
+            <a:solidFill>
+              <a:schemeClr val="tx1"/>
+            </a:solidFill>
+            <a:tailEnd type="none"/>
+          </a:ln>
+        </p:spPr>
+        <p:style>
+          <a:lnRef idx="1">
+            <a:schemeClr val="accent1"/>
+          </a:lnRef>
+          <a:fillRef idx="0">
+            <a:schemeClr val="accent1"/>
+          </a:fillRef>
+          <a:effectRef idx="0">
+            <a:schemeClr val="accent1"/>
+          </a:effectRef>
+          <a:fontRef idx="minor">
+            <a:schemeClr val="tx1"/>
+          </a:fontRef>
+        </p:style>
+      </p:cxnSp>
+      <p:cxnSp>
+        <p:nvCxnSpPr>
+          <p:cNvPr id="15" name="Gerade Verbindung mit Pfeil 14"/>
+          <p:cNvCxnSpPr>
+            <a:endCxn id="7" idx="2"/>
+          </p:cNvCxnSpPr>
+          <p:nvPr/>
+        </p:nvCxnSpPr>
+        <p:spPr>
+          <a:xfrm flipV="1">
+            <a:off x="2555776" y="1520788"/>
+            <a:ext cx="792088" cy="36004"/>
+          </a:xfrm>
+          <a:prstGeom prst="straightConnector1">
+            <a:avLst/>
+          </a:prstGeom>
+          <a:ln w="6350">
+            <a:solidFill>
+              <a:schemeClr val="tx1"/>
+            </a:solidFill>
+            <a:tailEnd type="none"/>
+          </a:ln>
+        </p:spPr>
+        <p:style>
+          <a:lnRef idx="1">
+            <a:schemeClr val="accent1"/>
+          </a:lnRef>
+          <a:fillRef idx="0">
+            <a:schemeClr val="accent1"/>
+          </a:fillRef>
+          <a:effectRef idx="0">
+            <a:schemeClr val="accent1"/>
+          </a:effectRef>
+          <a:fontRef idx="minor">
+            <a:schemeClr val="tx1"/>
+          </a:fontRef>
+        </p:style>
+      </p:cxnSp>
+      <p:cxnSp>
+        <p:nvCxnSpPr>
+          <p:cNvPr id="18" name="Gerade Verbindung mit Pfeil 17"/>
+          <p:cNvCxnSpPr>
+            <a:endCxn id="8" idx="2"/>
+          </p:cNvCxnSpPr>
+          <p:nvPr/>
+        </p:nvCxnSpPr>
+        <p:spPr>
+          <a:xfrm>
+            <a:off x="2555776" y="1772816"/>
+            <a:ext cx="792088" cy="307103"/>
+          </a:xfrm>
+          <a:prstGeom prst="straightConnector1">
+            <a:avLst/>
+          </a:prstGeom>
+          <a:ln w="6350">
+            <a:solidFill>
+              <a:schemeClr val="tx1"/>
+            </a:solidFill>
+            <a:tailEnd type="none"/>
+          </a:ln>
+        </p:spPr>
+        <p:style>
+          <a:lnRef idx="1">
+            <a:schemeClr val="accent1"/>
+          </a:lnRef>
+          <a:fillRef idx="0">
+            <a:schemeClr val="accent1"/>
+          </a:fillRef>
+          <a:effectRef idx="0">
+            <a:schemeClr val="accent1"/>
+          </a:effectRef>
+          <a:fontRef idx="minor">
+            <a:schemeClr val="tx1"/>
+          </a:fontRef>
+        </p:style>
+      </p:cxnSp>
+      <p:cxnSp>
+        <p:nvCxnSpPr>
+          <p:cNvPr id="21" name="Gerade Verbindung mit Pfeil 20"/>
+          <p:cNvCxnSpPr>
+            <a:endCxn id="9" idx="2"/>
+          </p:cNvCxnSpPr>
+          <p:nvPr/>
+        </p:nvCxnSpPr>
+        <p:spPr>
+          <a:xfrm>
+            <a:off x="2483768" y="1916832"/>
+            <a:ext cx="864096" cy="709148"/>
+          </a:xfrm>
+          <a:prstGeom prst="straightConnector1">
+            <a:avLst/>
+          </a:prstGeom>
+          <a:ln w="6350">
+            <a:solidFill>
+              <a:schemeClr val="tx1"/>
+            </a:solidFill>
+            <a:tailEnd type="none"/>
+          </a:ln>
+        </p:spPr>
+        <p:style>
+          <a:lnRef idx="1">
+            <a:schemeClr val="accent1"/>
+          </a:lnRef>
+          <a:fillRef idx="0">
+            <a:schemeClr val="accent1"/>
+          </a:fillRef>
+          <a:effectRef idx="0">
+            <a:schemeClr val="accent1"/>
+          </a:effectRef>
+          <a:fontRef idx="minor">
+            <a:schemeClr val="tx1"/>
+          </a:fontRef>
+        </p:style>
+      </p:cxnSp>
+      <p:sp>
+        <p:nvSpPr>
+          <p:cNvPr id="16" name="Ellipse 15"/>
+          <p:cNvSpPr/>
+          <p:nvPr/>
+        </p:nvSpPr>
+        <p:spPr>
+          <a:xfrm>
+            <a:off x="2195736" y="1340768"/>
+            <a:ext cx="144016" cy="144016"/>
+          </a:xfrm>
+          <a:prstGeom prst="ellipse">
+            <a:avLst/>
+          </a:prstGeom>
+          <a:noFill/>
+          <a:ln w="6350">
+            <a:solidFill>
+              <a:schemeClr val="tx1"/>
+            </a:solidFill>
+          </a:ln>
+        </p:spPr>
+        <p:style>
+          <a:lnRef idx="2">
+            <a:schemeClr val="accent1">
+              <a:shade val="50000"/>
+            </a:schemeClr>
+          </a:lnRef>
+          <a:fillRef idx="1">
+            <a:schemeClr val="accent1"/>
+          </a:fillRef>
+          <a:effectRef idx="0">
+            <a:schemeClr val="accent1"/>
+          </a:effectRef>
+          <a:fontRef idx="minor">
+            <a:schemeClr val="lt1"/>
+          </a:fontRef>
+        </p:style>
+        <p:txBody>
+          <a:bodyPr rtlCol="0" anchor="ctr"/>
+          <a:lstStyle/>
+          <a:p>
+            <a:pPr algn="ctr"/>
             <a:endParaRPr lang="de-DE" sz="1200" dirty="0">
               <a:solidFill>
                 <a:schemeClr val="tx1"/>
@@ -9855,634 +10373,184 @@
           </a:p>
         </p:txBody>
       </p:sp>
-      <p:sp>
-        <p:nvSpPr>
-          <p:cNvPr id="4" name="Rechteck 3"/>
-          <p:cNvSpPr/>
-          <p:nvPr/>
-        </p:nvSpPr>
-        <p:spPr>
-          <a:xfrm>
-            <a:off x="2987824" y="260648"/>
-            <a:ext cx="2016224" cy="3168352"/>
-          </a:xfrm>
-          <a:prstGeom prst="rect">
-            <a:avLst/>
-          </a:prstGeom>
-          <a:noFill/>
-          <a:ln>
+      <p:cxnSp>
+        <p:nvCxnSpPr>
+          <p:cNvPr id="17" name="Gerade Verbindung mit Pfeil 16"/>
+          <p:cNvCxnSpPr>
+            <a:stCxn id="16" idx="4"/>
+          </p:cNvCxnSpPr>
+          <p:nvPr/>
+        </p:nvCxnSpPr>
+        <p:spPr>
+          <a:xfrm>
+            <a:off x="2267744" y="1484784"/>
+            <a:ext cx="0" cy="216024"/>
+          </a:xfrm>
+          <a:prstGeom prst="straightConnector1">
+            <a:avLst/>
+          </a:prstGeom>
+          <a:ln w="6350">
             <a:solidFill>
               <a:schemeClr val="tx1"/>
             </a:solidFill>
-          </a:ln>
-        </p:spPr>
-        <p:style>
-          <a:lnRef idx="2">
-            <a:schemeClr val="accent1">
-              <a:shade val="50000"/>
-            </a:schemeClr>
-          </a:lnRef>
-          <a:fillRef idx="1">
-            <a:schemeClr val="accent1"/>
-          </a:fillRef>
-          <a:effectRef idx="0">
-            <a:schemeClr val="accent1"/>
-          </a:effectRef>
-          <a:fontRef idx="minor">
-            <a:schemeClr val="lt1"/>
-          </a:fontRef>
-        </p:style>
-        <p:txBody>
-          <a:bodyPr rtlCol="0" anchor="ctr"/>
-          <a:lstStyle/>
-          <a:p>
-            <a:pPr algn="ctr"/>
-            <a:endParaRPr lang="de-DE" sz="1200" dirty="0"/>
-          </a:p>
-        </p:txBody>
-      </p:sp>
-      <p:sp>
-        <p:nvSpPr>
-          <p:cNvPr id="5" name="Ellipse 4"/>
-          <p:cNvSpPr/>
-          <p:nvPr/>
-        </p:nvSpPr>
-        <p:spPr>
-          <a:xfrm>
-            <a:off x="3347864" y="332656"/>
-            <a:ext cx="1273405" cy="432048"/>
-          </a:xfrm>
-          <a:prstGeom prst="ellipse">
-            <a:avLst/>
-          </a:prstGeom>
-          <a:noFill/>
-          <a:ln>
+            <a:tailEnd type="none"/>
+          </a:ln>
+        </p:spPr>
+        <p:style>
+          <a:lnRef idx="1">
+            <a:schemeClr val="accent1"/>
+          </a:lnRef>
+          <a:fillRef idx="0">
+            <a:schemeClr val="accent1"/>
+          </a:fillRef>
+          <a:effectRef idx="0">
+            <a:schemeClr val="accent1"/>
+          </a:effectRef>
+          <a:fontRef idx="minor">
+            <a:schemeClr val="tx1"/>
+          </a:fontRef>
+        </p:style>
+      </p:cxnSp>
+      <p:cxnSp>
+        <p:nvCxnSpPr>
+          <p:cNvPr id="23" name="Gerade Verbindung mit Pfeil 22"/>
+          <p:cNvCxnSpPr/>
+          <p:nvPr/>
+        </p:nvCxnSpPr>
+        <p:spPr>
+          <a:xfrm>
+            <a:off x="2267744" y="1700808"/>
+            <a:ext cx="72008" cy="216024"/>
+          </a:xfrm>
+          <a:prstGeom prst="straightConnector1">
+            <a:avLst/>
+          </a:prstGeom>
+          <a:ln w="6350">
             <a:solidFill>
               <a:schemeClr val="tx1"/>
             </a:solidFill>
-          </a:ln>
-        </p:spPr>
-        <p:style>
-          <a:lnRef idx="2">
-            <a:schemeClr val="accent1">
-              <a:shade val="50000"/>
-            </a:schemeClr>
-          </a:lnRef>
-          <a:fillRef idx="1">
-            <a:schemeClr val="accent1"/>
-          </a:fillRef>
-          <a:effectRef idx="0">
-            <a:schemeClr val="accent1"/>
-          </a:effectRef>
-          <a:fontRef idx="minor">
-            <a:schemeClr val="lt1"/>
-          </a:fontRef>
-        </p:style>
-        <p:txBody>
-          <a:bodyPr rtlCol="0" anchor="ctr"/>
-          <a:lstStyle/>
-          <a:p>
-            <a:pPr algn="ctr"/>
-            <a:r>
-              <a:rPr lang="de-DE" sz="1200" dirty="0" smtClean="0">
-                <a:solidFill>
-                  <a:schemeClr val="tx1"/>
-                </a:solidFill>
-              </a:rPr>
-              <a:t>Abschlüsse anzeigen</a:t>
-            </a:r>
-            <a:endParaRPr lang="de-DE" sz="1200" dirty="0">
-              <a:solidFill>
-                <a:schemeClr val="tx1"/>
-              </a:solidFill>
-            </a:endParaRPr>
-          </a:p>
-        </p:txBody>
-      </p:sp>
-      <p:sp>
-        <p:nvSpPr>
-          <p:cNvPr id="6" name="Ellipse 5"/>
-          <p:cNvSpPr/>
-          <p:nvPr/>
-        </p:nvSpPr>
-        <p:spPr>
-          <a:xfrm>
-            <a:off x="3275856" y="908720"/>
-            <a:ext cx="1432581" cy="432048"/>
-          </a:xfrm>
-          <a:prstGeom prst="ellipse">
-            <a:avLst/>
-          </a:prstGeom>
-          <a:noFill/>
-          <a:ln>
+            <a:tailEnd type="none"/>
+          </a:ln>
+        </p:spPr>
+        <p:style>
+          <a:lnRef idx="1">
+            <a:schemeClr val="accent1"/>
+          </a:lnRef>
+          <a:fillRef idx="0">
+            <a:schemeClr val="accent1"/>
+          </a:fillRef>
+          <a:effectRef idx="0">
+            <a:schemeClr val="accent1"/>
+          </a:effectRef>
+          <a:fontRef idx="minor">
+            <a:schemeClr val="tx1"/>
+          </a:fontRef>
+        </p:style>
+      </p:cxnSp>
+      <p:cxnSp>
+        <p:nvCxnSpPr>
+          <p:cNvPr id="26" name="Gerade Verbindung mit Pfeil 25"/>
+          <p:cNvCxnSpPr/>
+          <p:nvPr/>
+        </p:nvCxnSpPr>
+        <p:spPr>
+          <a:xfrm flipH="1">
+            <a:off x="2195736" y="1700808"/>
+            <a:ext cx="72008" cy="216024"/>
+          </a:xfrm>
+          <a:prstGeom prst="straightConnector1">
+            <a:avLst/>
+          </a:prstGeom>
+          <a:ln w="6350">
             <a:solidFill>
               <a:schemeClr val="tx1"/>
             </a:solidFill>
-          </a:ln>
-        </p:spPr>
-        <p:style>
-          <a:lnRef idx="2">
-            <a:schemeClr val="accent1">
-              <a:shade val="50000"/>
-            </a:schemeClr>
-          </a:lnRef>
-          <a:fillRef idx="1">
-            <a:schemeClr val="accent1"/>
-          </a:fillRef>
-          <a:effectRef idx="0">
-            <a:schemeClr val="accent1"/>
-          </a:effectRef>
-          <a:fontRef idx="minor">
-            <a:schemeClr val="lt1"/>
-          </a:fontRef>
-        </p:style>
-        <p:txBody>
-          <a:bodyPr rtlCol="0" anchor="ctr"/>
-          <a:lstStyle/>
-          <a:p>
-            <a:pPr algn="ctr"/>
-            <a:r>
-              <a:rPr lang="de-DE" sz="1200" dirty="0" smtClean="0">
-                <a:solidFill>
-                  <a:schemeClr val="tx1"/>
-                </a:solidFill>
-              </a:rPr>
-              <a:t>Kurse/Noten anzeigen</a:t>
-            </a:r>
-            <a:endParaRPr lang="de-DE" sz="1200" dirty="0">
-              <a:solidFill>
-                <a:schemeClr val="tx1"/>
-              </a:solidFill>
-            </a:endParaRPr>
-          </a:p>
-        </p:txBody>
-      </p:sp>
-      <p:sp>
-        <p:nvSpPr>
-          <p:cNvPr id="7" name="Ellipse 6"/>
-          <p:cNvSpPr/>
-          <p:nvPr/>
-        </p:nvSpPr>
-        <p:spPr>
-          <a:xfrm>
-            <a:off x="3275856" y="1556792"/>
-            <a:ext cx="1538697" cy="432048"/>
-          </a:xfrm>
-          <a:prstGeom prst="ellipse">
-            <a:avLst/>
-          </a:prstGeom>
-          <a:noFill/>
-          <a:ln>
+            <a:tailEnd type="none"/>
+          </a:ln>
+        </p:spPr>
+        <p:style>
+          <a:lnRef idx="1">
+            <a:schemeClr val="accent1"/>
+          </a:lnRef>
+          <a:fillRef idx="0">
+            <a:schemeClr val="accent1"/>
+          </a:fillRef>
+          <a:effectRef idx="0">
+            <a:schemeClr val="accent1"/>
+          </a:effectRef>
+          <a:fontRef idx="minor">
+            <a:schemeClr val="tx1"/>
+          </a:fontRef>
+        </p:style>
+      </p:cxnSp>
+      <p:cxnSp>
+        <p:nvCxnSpPr>
+          <p:cNvPr id="31" name="Gerade Verbindung mit Pfeil 30"/>
+          <p:cNvCxnSpPr/>
+          <p:nvPr/>
+        </p:nvCxnSpPr>
+        <p:spPr>
+          <a:xfrm>
+            <a:off x="2123728" y="1556792"/>
+            <a:ext cx="288032" cy="0"/>
+          </a:xfrm>
+          <a:prstGeom prst="straightConnector1">
+            <a:avLst/>
+          </a:prstGeom>
+          <a:ln w="6350">
             <a:solidFill>
               <a:schemeClr val="tx1"/>
             </a:solidFill>
-          </a:ln>
-        </p:spPr>
-        <p:style>
-          <a:lnRef idx="2">
-            <a:schemeClr val="accent1">
-              <a:shade val="50000"/>
-            </a:schemeClr>
-          </a:lnRef>
-          <a:fillRef idx="1">
-            <a:schemeClr val="accent1"/>
-          </a:fillRef>
-          <a:effectRef idx="0">
-            <a:schemeClr val="accent1"/>
-          </a:effectRef>
-          <a:fontRef idx="minor">
-            <a:schemeClr val="lt1"/>
-          </a:fontRef>
-        </p:style>
-        <p:txBody>
-          <a:bodyPr rtlCol="0" anchor="ctr"/>
-          <a:lstStyle/>
-          <a:p>
-            <a:pPr algn="ctr"/>
-            <a:r>
-              <a:rPr lang="de-DE" sz="1200" dirty="0" smtClean="0">
-                <a:solidFill>
-                  <a:schemeClr val="tx1"/>
-                </a:solidFill>
-              </a:rPr>
-              <a:t>Kursdetails anzeigen</a:t>
-            </a:r>
-            <a:endParaRPr lang="de-DE" sz="1200" dirty="0">
-              <a:solidFill>
-                <a:schemeClr val="tx1"/>
-              </a:solidFill>
-            </a:endParaRPr>
-          </a:p>
-        </p:txBody>
-      </p:sp>
-      <p:sp>
-        <p:nvSpPr>
-          <p:cNvPr id="8" name="Ellipse 7"/>
-          <p:cNvSpPr/>
-          <p:nvPr/>
-        </p:nvSpPr>
-        <p:spPr>
-          <a:xfrm>
-            <a:off x="3275856" y="2204864"/>
-            <a:ext cx="1485639" cy="564228"/>
-          </a:xfrm>
-          <a:prstGeom prst="ellipse">
+            <a:tailEnd type="none"/>
+          </a:ln>
+        </p:spPr>
+        <p:style>
+          <a:lnRef idx="1">
+            <a:schemeClr val="accent1"/>
+          </a:lnRef>
+          <a:fillRef idx="0">
+            <a:schemeClr val="accent1"/>
+          </a:fillRef>
+          <a:effectRef idx="0">
+            <a:schemeClr val="accent1"/>
+          </a:effectRef>
+          <a:fontRef idx="minor">
+            <a:schemeClr val="tx1"/>
+          </a:fontRef>
+        </p:style>
+      </p:cxnSp>
+      <p:pic>
+        <p:nvPicPr>
+          <p:cNvPr id="1026" name="Picture 2"/>
+          <p:cNvPicPr>
+            <a:picLocks noChangeAspect="1" noChangeArrowheads="1"/>
+          </p:cNvPicPr>
+          <p:nvPr/>
+        </p:nvPicPr>
+        <p:blipFill>
+          <a:blip r:embed="rId2" cstate="print"/>
+          <a:srcRect/>
+          <a:stretch>
+            <a:fillRect/>
+          </a:stretch>
+        </p:blipFill>
+        <p:spPr bwMode="auto">
+          <a:xfrm>
+            <a:off x="5940152" y="188640"/>
+            <a:ext cx="2872216" cy="3188965"/>
+          </a:xfrm>
+          <a:prstGeom prst="rect">
             <a:avLst/>
           </a:prstGeom>
           <a:noFill/>
-          <a:ln>
-            <a:solidFill>
-              <a:schemeClr val="tx1"/>
-            </a:solidFill>
-          </a:ln>
-        </p:spPr>
-        <p:style>
-          <a:lnRef idx="2">
-            <a:schemeClr val="accent1">
-              <a:shade val="50000"/>
-            </a:schemeClr>
-          </a:lnRef>
-          <a:fillRef idx="1">
-            <a:schemeClr val="accent1"/>
-          </a:fillRef>
-          <a:effectRef idx="0">
-            <a:schemeClr val="accent1"/>
-          </a:effectRef>
-          <a:fontRef idx="minor">
-            <a:schemeClr val="lt1"/>
-          </a:fontRef>
-        </p:style>
-        <p:txBody>
-          <a:bodyPr rtlCol="0" anchor="ctr"/>
-          <a:lstStyle/>
-          <a:p>
-            <a:pPr algn="ctr"/>
-            <a:r>
-              <a:rPr lang="de-DE" sz="1200" dirty="0" smtClean="0">
-                <a:solidFill>
-                  <a:schemeClr val="tx1"/>
-                </a:solidFill>
-              </a:rPr>
-              <a:t>Kurse suchen und filtern</a:t>
-            </a:r>
-            <a:endParaRPr lang="de-DE" sz="1200" dirty="0">
-              <a:solidFill>
-                <a:schemeClr val="tx1"/>
-              </a:solidFill>
-            </a:endParaRPr>
-          </a:p>
-        </p:txBody>
-      </p:sp>
-      <p:sp>
-        <p:nvSpPr>
-          <p:cNvPr id="9" name="Ellipse 8"/>
-          <p:cNvSpPr/>
-          <p:nvPr/>
-        </p:nvSpPr>
-        <p:spPr>
-          <a:xfrm>
-            <a:off x="3419872" y="2852936"/>
-            <a:ext cx="1273405" cy="492220"/>
-          </a:xfrm>
-          <a:prstGeom prst="ellipse">
-            <a:avLst/>
-          </a:prstGeom>
-          <a:noFill/>
-          <a:ln>
-            <a:solidFill>
-              <a:schemeClr val="tx1"/>
-            </a:solidFill>
-          </a:ln>
-        </p:spPr>
-        <p:style>
-          <a:lnRef idx="2">
-            <a:schemeClr val="accent1">
-              <a:shade val="50000"/>
-            </a:schemeClr>
-          </a:lnRef>
-          <a:fillRef idx="1">
-            <a:schemeClr val="accent1"/>
-          </a:fillRef>
-          <a:effectRef idx="0">
-            <a:schemeClr val="accent1"/>
-          </a:effectRef>
-          <a:fontRef idx="minor">
-            <a:schemeClr val="lt1"/>
-          </a:fontRef>
-        </p:style>
-        <p:txBody>
-          <a:bodyPr rtlCol="0" anchor="ctr"/>
-          <a:lstStyle/>
-          <a:p>
-            <a:pPr algn="ctr"/>
-            <a:r>
-              <a:rPr lang="de-DE" sz="1200" dirty="0" smtClean="0">
-                <a:solidFill>
-                  <a:schemeClr val="tx1"/>
-                </a:solidFill>
-              </a:rPr>
-              <a:t>Noten „teilen“</a:t>
-            </a:r>
-            <a:endParaRPr lang="de-DE" sz="1200" dirty="0">
-              <a:solidFill>
-                <a:schemeClr val="tx1"/>
-              </a:solidFill>
-            </a:endParaRPr>
-          </a:p>
-        </p:txBody>
-      </p:sp>
-      <p:cxnSp>
-        <p:nvCxnSpPr>
-          <p:cNvPr id="11" name="Gerade Verbindung mit Pfeil 10"/>
-          <p:cNvCxnSpPr>
-            <a:stCxn id="2" idx="6"/>
-            <a:endCxn id="5" idx="2"/>
-          </p:cNvCxnSpPr>
-          <p:nvPr/>
-        </p:nvCxnSpPr>
-        <p:spPr>
-          <a:xfrm flipV="1">
-            <a:off x="2392811" y="548680"/>
-            <a:ext cx="955053" cy="1218218"/>
-          </a:xfrm>
-          <a:prstGeom prst="straightConnector1">
-            <a:avLst/>
-          </a:prstGeom>
-          <a:ln w="15875">
-            <a:solidFill>
-              <a:schemeClr val="tx1"/>
-            </a:solidFill>
-            <a:tailEnd type="arrow"/>
-          </a:ln>
-        </p:spPr>
-        <p:style>
-          <a:lnRef idx="1">
-            <a:schemeClr val="accent1"/>
-          </a:lnRef>
-          <a:fillRef idx="0">
-            <a:schemeClr val="accent1"/>
-          </a:fillRef>
-          <a:effectRef idx="0">
-            <a:schemeClr val="accent1"/>
-          </a:effectRef>
-          <a:fontRef idx="minor">
-            <a:schemeClr val="tx1"/>
-          </a:fontRef>
-        </p:style>
-      </p:cxnSp>
-      <p:cxnSp>
-        <p:nvCxnSpPr>
-          <p:cNvPr id="12" name="Gerade Verbindung mit Pfeil 11"/>
-          <p:cNvCxnSpPr>
-            <a:stCxn id="2" idx="6"/>
-            <a:endCxn id="6" idx="2"/>
-          </p:cNvCxnSpPr>
-          <p:nvPr/>
-        </p:nvCxnSpPr>
-        <p:spPr>
-          <a:xfrm flipV="1">
-            <a:off x="2392811" y="1124744"/>
-            <a:ext cx="883045" cy="642154"/>
-          </a:xfrm>
-          <a:prstGeom prst="straightConnector1">
-            <a:avLst/>
-          </a:prstGeom>
-          <a:ln w="15875">
-            <a:solidFill>
-              <a:schemeClr val="tx1"/>
-            </a:solidFill>
-            <a:tailEnd type="arrow"/>
-          </a:ln>
-        </p:spPr>
-        <p:style>
-          <a:lnRef idx="1">
-            <a:schemeClr val="accent1"/>
-          </a:lnRef>
-          <a:fillRef idx="0">
-            <a:schemeClr val="accent1"/>
-          </a:fillRef>
-          <a:effectRef idx="0">
-            <a:schemeClr val="accent1"/>
-          </a:effectRef>
-          <a:fontRef idx="minor">
-            <a:schemeClr val="tx1"/>
-          </a:fontRef>
-        </p:style>
-      </p:cxnSp>
-      <p:cxnSp>
-        <p:nvCxnSpPr>
-          <p:cNvPr id="15" name="Gerade Verbindung mit Pfeil 14"/>
-          <p:cNvCxnSpPr>
-            <a:stCxn id="2" idx="6"/>
-            <a:endCxn id="7" idx="2"/>
-          </p:cNvCxnSpPr>
-          <p:nvPr/>
-        </p:nvCxnSpPr>
-        <p:spPr>
-          <a:xfrm>
-            <a:off x="2392811" y="1766898"/>
-            <a:ext cx="883045" cy="5918"/>
-          </a:xfrm>
-          <a:prstGeom prst="straightConnector1">
-            <a:avLst/>
-          </a:prstGeom>
-          <a:ln w="15875">
-            <a:solidFill>
-              <a:schemeClr val="tx1"/>
-            </a:solidFill>
-            <a:tailEnd type="arrow"/>
-          </a:ln>
-        </p:spPr>
-        <p:style>
-          <a:lnRef idx="1">
-            <a:schemeClr val="accent1"/>
-          </a:lnRef>
-          <a:fillRef idx="0">
-            <a:schemeClr val="accent1"/>
-          </a:fillRef>
-          <a:effectRef idx="0">
-            <a:schemeClr val="accent1"/>
-          </a:effectRef>
-          <a:fontRef idx="minor">
-            <a:schemeClr val="tx1"/>
-          </a:fontRef>
-        </p:style>
-      </p:cxnSp>
-      <p:cxnSp>
-        <p:nvCxnSpPr>
-          <p:cNvPr id="18" name="Gerade Verbindung mit Pfeil 17"/>
-          <p:cNvCxnSpPr>
-            <a:stCxn id="2" idx="6"/>
-            <a:endCxn id="8" idx="2"/>
-          </p:cNvCxnSpPr>
-          <p:nvPr/>
-        </p:nvCxnSpPr>
-        <p:spPr>
-          <a:xfrm>
-            <a:off x="2392811" y="1766898"/>
-            <a:ext cx="883045" cy="720080"/>
-          </a:xfrm>
-          <a:prstGeom prst="straightConnector1">
-            <a:avLst/>
-          </a:prstGeom>
-          <a:ln w="15875">
-            <a:solidFill>
-              <a:schemeClr val="tx1"/>
-            </a:solidFill>
-            <a:tailEnd type="arrow"/>
-          </a:ln>
-        </p:spPr>
-        <p:style>
-          <a:lnRef idx="1">
-            <a:schemeClr val="accent1"/>
-          </a:lnRef>
-          <a:fillRef idx="0">
-            <a:schemeClr val="accent1"/>
-          </a:fillRef>
-          <a:effectRef idx="0">
-            <a:schemeClr val="accent1"/>
-          </a:effectRef>
-          <a:fontRef idx="minor">
-            <a:schemeClr val="tx1"/>
-          </a:fontRef>
-        </p:style>
-      </p:cxnSp>
-      <p:cxnSp>
-        <p:nvCxnSpPr>
-          <p:cNvPr id="21" name="Gerade Verbindung mit Pfeil 20"/>
-          <p:cNvCxnSpPr>
-            <a:stCxn id="2" idx="6"/>
-            <a:endCxn id="9" idx="2"/>
-          </p:cNvCxnSpPr>
-          <p:nvPr/>
-        </p:nvCxnSpPr>
-        <p:spPr>
-          <a:xfrm>
-            <a:off x="2392811" y="1766898"/>
-            <a:ext cx="1027061" cy="1332148"/>
-          </a:xfrm>
-          <a:prstGeom prst="straightConnector1">
-            <a:avLst/>
-          </a:prstGeom>
-          <a:ln w="15875">
-            <a:solidFill>
-              <a:schemeClr val="tx1"/>
-            </a:solidFill>
-            <a:tailEnd type="arrow"/>
-          </a:ln>
-        </p:spPr>
-        <p:style>
-          <a:lnRef idx="1">
-            <a:schemeClr val="accent1"/>
-          </a:lnRef>
-          <a:fillRef idx="0">
-            <a:schemeClr val="accent1"/>
-          </a:fillRef>
-          <a:effectRef idx="0">
-            <a:schemeClr val="accent1"/>
-          </a:effectRef>
-          <a:fontRef idx="minor">
-            <a:schemeClr val="tx1"/>
-          </a:fontRef>
-        </p:style>
-      </p:cxnSp>
-      <p:sp>
-        <p:nvSpPr>
-          <p:cNvPr id="37" name="Rechteck 36"/>
-          <p:cNvSpPr/>
-          <p:nvPr/>
-        </p:nvSpPr>
-        <p:spPr>
-          <a:xfrm>
-            <a:off x="5580112" y="260648"/>
-            <a:ext cx="1224136" cy="3168352"/>
-          </a:xfrm>
-          <a:prstGeom prst="rect">
-            <a:avLst/>
-          </a:prstGeom>
-          <a:noFill/>
-          <a:ln>
-            <a:solidFill>
-              <a:schemeClr val="tx1"/>
-            </a:solidFill>
-          </a:ln>
-        </p:spPr>
-        <p:style>
-          <a:lnRef idx="2">
-            <a:schemeClr val="accent1">
-              <a:shade val="50000"/>
-            </a:schemeClr>
-          </a:lnRef>
-          <a:fillRef idx="1">
-            <a:schemeClr val="accent1"/>
-          </a:fillRef>
-          <a:effectRef idx="0">
-            <a:schemeClr val="accent1"/>
-          </a:effectRef>
-          <a:fontRef idx="minor">
-            <a:schemeClr val="lt1"/>
-          </a:fontRef>
-        </p:style>
-        <p:txBody>
-          <a:bodyPr rtlCol="0" anchor="ctr"/>
-          <a:lstStyle/>
-          <a:p>
-            <a:pPr algn="ctr"/>
-            <a:r>
-              <a:rPr lang="de-DE" sz="1600" dirty="0" smtClean="0">
-                <a:solidFill>
-                  <a:schemeClr val="tx1"/>
-                </a:solidFill>
-              </a:rPr>
-              <a:t>QIS-Server</a:t>
-            </a:r>
-            <a:endParaRPr lang="de-DE" sz="1600" dirty="0">
-              <a:solidFill>
-                <a:schemeClr val="tx1"/>
-              </a:solidFill>
-            </a:endParaRPr>
-          </a:p>
-        </p:txBody>
-      </p:sp>
-      <p:cxnSp>
-        <p:nvCxnSpPr>
-          <p:cNvPr id="70" name="Gerade Verbindung mit Pfeil 69"/>
-          <p:cNvCxnSpPr>
-            <a:stCxn id="4" idx="3"/>
-            <a:endCxn id="37" idx="1"/>
-          </p:cNvCxnSpPr>
-          <p:nvPr/>
-        </p:nvCxnSpPr>
-        <p:spPr>
-          <a:xfrm>
-            <a:off x="5004048" y="1844824"/>
-            <a:ext cx="576064" cy="0"/>
-          </a:xfrm>
-          <a:prstGeom prst="straightConnector1">
-            <a:avLst/>
-          </a:prstGeom>
-          <a:ln w="25400">
-            <a:solidFill>
-              <a:schemeClr val="tx1"/>
-            </a:solidFill>
-            <a:tailEnd type="triangle"/>
-          </a:ln>
-        </p:spPr>
-        <p:style>
-          <a:lnRef idx="1">
-            <a:schemeClr val="accent1"/>
-          </a:lnRef>
-          <a:fillRef idx="0">
-            <a:schemeClr val="accent1"/>
-          </a:fillRef>
-          <a:effectRef idx="0">
-            <a:schemeClr val="accent1"/>
-          </a:effectRef>
-          <a:fontRef idx="minor">
-            <a:schemeClr val="tx1"/>
-          </a:fontRef>
-        </p:style>
-      </p:cxnSp>
+          <a:ln w="9525">
+            <a:noFill/>
+            <a:miter lim="800000"/>
+            <a:headEnd/>
+            <a:tailEnd/>
+          </a:ln>
+        </p:spPr>
+      </p:pic>
     </p:spTree>
   </p:cSld>
   <p:clrMapOvr>

</xml_diff>

<commit_message>
updates in presentation and report
</commit_message>
<xml_diff>
--- a/docs/notenapp.pptx
+++ b/docs/notenapp.pptx
@@ -292,7 +292,7 @@
             <a:fld id="{F0B96F50-2E74-4531-A9D7-82F060543DE4}" type="datetimeFigureOut">
               <a:rPr lang="de-DE" smtClean="0"/>
               <a:pPr/>
-              <a:t>13.01.2013</a:t>
+              <a:t>14.01.2013</a:t>
             </a:fld>
             <a:endParaRPr lang="de-DE"/>
           </a:p>
@@ -459,7 +459,7 @@
             <a:fld id="{F0B96F50-2E74-4531-A9D7-82F060543DE4}" type="datetimeFigureOut">
               <a:rPr lang="de-DE" smtClean="0"/>
               <a:pPr/>
-              <a:t>13.01.2013</a:t>
+              <a:t>14.01.2013</a:t>
             </a:fld>
             <a:endParaRPr lang="de-DE"/>
           </a:p>
@@ -636,7 +636,7 @@
             <a:fld id="{F0B96F50-2E74-4531-A9D7-82F060543DE4}" type="datetimeFigureOut">
               <a:rPr lang="de-DE" smtClean="0"/>
               <a:pPr/>
-              <a:t>13.01.2013</a:t>
+              <a:t>14.01.2013</a:t>
             </a:fld>
             <a:endParaRPr lang="de-DE"/>
           </a:p>
@@ -803,7 +803,7 @@
             <a:fld id="{F0B96F50-2E74-4531-A9D7-82F060543DE4}" type="datetimeFigureOut">
               <a:rPr lang="de-DE" smtClean="0"/>
               <a:pPr/>
-              <a:t>13.01.2013</a:t>
+              <a:t>14.01.2013</a:t>
             </a:fld>
             <a:endParaRPr lang="de-DE"/>
           </a:p>
@@ -1046,7 +1046,7 @@
             <a:fld id="{F0B96F50-2E74-4531-A9D7-82F060543DE4}" type="datetimeFigureOut">
               <a:rPr lang="de-DE" smtClean="0"/>
               <a:pPr/>
-              <a:t>13.01.2013</a:t>
+              <a:t>14.01.2013</a:t>
             </a:fld>
             <a:endParaRPr lang="de-DE"/>
           </a:p>
@@ -1331,7 +1331,7 @@
             <a:fld id="{F0B96F50-2E74-4531-A9D7-82F060543DE4}" type="datetimeFigureOut">
               <a:rPr lang="de-DE" smtClean="0"/>
               <a:pPr/>
-              <a:t>13.01.2013</a:t>
+              <a:t>14.01.2013</a:t>
             </a:fld>
             <a:endParaRPr lang="de-DE"/>
           </a:p>
@@ -1750,7 +1750,7 @@
             <a:fld id="{F0B96F50-2E74-4531-A9D7-82F060543DE4}" type="datetimeFigureOut">
               <a:rPr lang="de-DE" smtClean="0"/>
               <a:pPr/>
-              <a:t>13.01.2013</a:t>
+              <a:t>14.01.2013</a:t>
             </a:fld>
             <a:endParaRPr lang="de-DE"/>
           </a:p>
@@ -1865,7 +1865,7 @@
             <a:fld id="{F0B96F50-2E74-4531-A9D7-82F060543DE4}" type="datetimeFigureOut">
               <a:rPr lang="de-DE" smtClean="0"/>
               <a:pPr/>
-              <a:t>13.01.2013</a:t>
+              <a:t>14.01.2013</a:t>
             </a:fld>
             <a:endParaRPr lang="de-DE"/>
           </a:p>
@@ -1957,7 +1957,7 @@
             <a:fld id="{F0B96F50-2E74-4531-A9D7-82F060543DE4}" type="datetimeFigureOut">
               <a:rPr lang="de-DE" smtClean="0"/>
               <a:pPr/>
-              <a:t>13.01.2013</a:t>
+              <a:t>14.01.2013</a:t>
             </a:fld>
             <a:endParaRPr lang="de-DE"/>
           </a:p>
@@ -2231,7 +2231,7 @@
             <a:fld id="{F0B96F50-2E74-4531-A9D7-82F060543DE4}" type="datetimeFigureOut">
               <a:rPr lang="de-DE" smtClean="0"/>
               <a:pPr/>
-              <a:t>13.01.2013</a:t>
+              <a:t>14.01.2013</a:t>
             </a:fld>
             <a:endParaRPr lang="de-DE"/>
           </a:p>
@@ -2481,7 +2481,7 @@
             <a:fld id="{F0B96F50-2E74-4531-A9D7-82F060543DE4}" type="datetimeFigureOut">
               <a:rPr lang="de-DE" smtClean="0"/>
               <a:pPr/>
-              <a:t>13.01.2013</a:t>
+              <a:t>14.01.2013</a:t>
             </a:fld>
             <a:endParaRPr lang="de-DE"/>
           </a:p>
@@ -2691,7 +2691,7 @@
             <a:fld id="{F0B96F50-2E74-4531-A9D7-82F060543DE4}" type="datetimeFigureOut">
               <a:rPr lang="de-DE" smtClean="0"/>
               <a:pPr/>
-              <a:t>13.01.2013</a:t>
+              <a:t>14.01.2013</a:t>
             </a:fld>
             <a:endParaRPr lang="de-DE"/>
           </a:p>

</xml_diff>